<commit_message>
running to update manuscript figures/tables
</commit_message>
<xml_diff>
--- a/FiguresCombined.pptx
+++ b/FiguresCombined.pptx
@@ -205,7 +205,7 @@
           <a:p>
             <a:fld id="{E480B2E8-FF63-F947-9198-F22E2E89E13F}" type="datetimeFigureOut">
               <a:rPr lang="en-US" smtClean="0"/>
-              <a:t>8/2/2022</a:t>
+              <a:t>8/4/2022</a:t>
             </a:fld>
             <a:endParaRPr lang="en-US"/>
           </a:p>
@@ -955,7 +955,7 @@
           <a:p>
             <a:fld id="{AEF7624F-E6AE-A849-AFA2-D42753B22867}" type="datetimeFigureOut">
               <a:rPr lang="en-US" smtClean="0"/>
-              <a:t>8/2/2022</a:t>
+              <a:t>8/4/2022</a:t>
             </a:fld>
             <a:endParaRPr lang="en-US"/>
           </a:p>
@@ -1153,7 +1153,7 @@
           <a:p>
             <a:fld id="{AEF7624F-E6AE-A849-AFA2-D42753B22867}" type="datetimeFigureOut">
               <a:rPr lang="en-US" smtClean="0"/>
-              <a:t>8/2/2022</a:t>
+              <a:t>8/4/2022</a:t>
             </a:fld>
             <a:endParaRPr lang="en-US"/>
           </a:p>
@@ -1361,7 +1361,7 @@
           <a:p>
             <a:fld id="{AEF7624F-E6AE-A849-AFA2-D42753B22867}" type="datetimeFigureOut">
               <a:rPr lang="en-US" smtClean="0"/>
-              <a:t>8/2/2022</a:t>
+              <a:t>8/4/2022</a:t>
             </a:fld>
             <a:endParaRPr lang="en-US"/>
           </a:p>
@@ -1559,7 +1559,7 @@
           <a:p>
             <a:fld id="{AEF7624F-E6AE-A849-AFA2-D42753B22867}" type="datetimeFigureOut">
               <a:rPr lang="en-US" smtClean="0"/>
-              <a:t>8/2/2022</a:t>
+              <a:t>8/4/2022</a:t>
             </a:fld>
             <a:endParaRPr lang="en-US"/>
           </a:p>
@@ -1834,7 +1834,7 @@
           <a:p>
             <a:fld id="{AEF7624F-E6AE-A849-AFA2-D42753B22867}" type="datetimeFigureOut">
               <a:rPr lang="en-US" smtClean="0"/>
-              <a:t>8/2/2022</a:t>
+              <a:t>8/4/2022</a:t>
             </a:fld>
             <a:endParaRPr lang="en-US"/>
           </a:p>
@@ -2099,7 +2099,7 @@
           <a:p>
             <a:fld id="{AEF7624F-E6AE-A849-AFA2-D42753B22867}" type="datetimeFigureOut">
               <a:rPr lang="en-US" smtClean="0"/>
-              <a:t>8/2/2022</a:t>
+              <a:t>8/4/2022</a:t>
             </a:fld>
             <a:endParaRPr lang="en-US"/>
           </a:p>
@@ -2511,7 +2511,7 @@
           <a:p>
             <a:fld id="{AEF7624F-E6AE-A849-AFA2-D42753B22867}" type="datetimeFigureOut">
               <a:rPr lang="en-US" smtClean="0"/>
-              <a:t>8/2/2022</a:t>
+              <a:t>8/4/2022</a:t>
             </a:fld>
             <a:endParaRPr lang="en-US"/>
           </a:p>
@@ -2652,7 +2652,7 @@
           <a:p>
             <a:fld id="{AEF7624F-E6AE-A849-AFA2-D42753B22867}" type="datetimeFigureOut">
               <a:rPr lang="en-US" smtClean="0"/>
-              <a:t>8/2/2022</a:t>
+              <a:t>8/4/2022</a:t>
             </a:fld>
             <a:endParaRPr lang="en-US"/>
           </a:p>
@@ -2765,7 +2765,7 @@
           <a:p>
             <a:fld id="{AEF7624F-E6AE-A849-AFA2-D42753B22867}" type="datetimeFigureOut">
               <a:rPr lang="en-US" smtClean="0"/>
-              <a:t>8/2/2022</a:t>
+              <a:t>8/4/2022</a:t>
             </a:fld>
             <a:endParaRPr lang="en-US"/>
           </a:p>
@@ -3076,7 +3076,7 @@
           <a:p>
             <a:fld id="{AEF7624F-E6AE-A849-AFA2-D42753B22867}" type="datetimeFigureOut">
               <a:rPr lang="en-US" smtClean="0"/>
-              <a:t>8/2/2022</a:t>
+              <a:t>8/4/2022</a:t>
             </a:fld>
             <a:endParaRPr lang="en-US"/>
           </a:p>
@@ -3364,7 +3364,7 @@
           <a:p>
             <a:fld id="{AEF7624F-E6AE-A849-AFA2-D42753B22867}" type="datetimeFigureOut">
               <a:rPr lang="en-US" smtClean="0"/>
-              <a:t>8/2/2022</a:t>
+              <a:t>8/4/2022</a:t>
             </a:fld>
             <a:endParaRPr lang="en-US"/>
           </a:p>
@@ -3605,7 +3605,7 @@
           <a:p>
             <a:fld id="{AEF7624F-E6AE-A849-AFA2-D42753B22867}" type="datetimeFigureOut">
               <a:rPr lang="en-US" smtClean="0"/>
-              <a:t>8/2/2022</a:t>
+              <a:t>8/4/2022</a:t>
             </a:fld>
             <a:endParaRPr lang="en-US"/>
           </a:p>
@@ -4735,7 +4735,7 @@
                 </a:solidFill>
                 <a:latin typeface="Helvetica" pitchFamily="2" charset="0"/>
               </a:rPr>
-              <a:t>ONLY USIN SCORES</a:t>
+              <a:t>ONLY USING SCORES</a:t>
             </a:r>
           </a:p>
         </p:txBody>
@@ -5647,8 +5647,8 @@
         </p:blipFill>
         <p:spPr>
           <a:xfrm>
-            <a:off x="1996305" y="666174"/>
-            <a:ext cx="3993294" cy="2662195"/>
+            <a:off x="1996306" y="666174"/>
+            <a:ext cx="3993292" cy="2662195"/>
           </a:xfrm>
           <a:prstGeom prst="rect">
             <a:avLst/>
@@ -5677,7 +5677,7 @@
         <p:spPr>
           <a:xfrm>
             <a:off x="6202403" y="666174"/>
-            <a:ext cx="3993292" cy="2662195"/>
+            <a:ext cx="3993292" cy="2662194"/>
           </a:xfrm>
           <a:prstGeom prst="rect">
             <a:avLst/>
@@ -5706,7 +5706,7 @@
         <p:spPr>
           <a:xfrm>
             <a:off x="6202404" y="3963342"/>
-            <a:ext cx="3993291" cy="2662194"/>
+            <a:ext cx="3993291" cy="2662193"/>
           </a:xfrm>
           <a:prstGeom prst="rect">
             <a:avLst/>
@@ -5735,7 +5735,7 @@
         <p:spPr>
           <a:xfrm>
             <a:off x="1996301" y="3963340"/>
-            <a:ext cx="3993295" cy="2662196"/>
+            <a:ext cx="3993294" cy="2662196"/>
           </a:xfrm>
           <a:prstGeom prst="rect">
             <a:avLst/>
@@ -6314,13 +6314,12 @@
         </p:nvPicPr>
         <p:blipFill>
           <a:blip r:embed="rId2"/>
-          <a:stretch>
-            <a:fillRect/>
-          </a:stretch>
+          <a:srcRect l="2271" r="2271"/>
+          <a:stretch/>
         </p:blipFill>
         <p:spPr>
           <a:xfrm>
-            <a:off x="2267155" y="3767671"/>
+            <a:off x="544187" y="3313836"/>
             <a:ext cx="2909530" cy="2919494"/>
           </a:xfrm>
           <a:prstGeom prst="rect">
@@ -6344,14 +6343,13 @@
         </p:nvPicPr>
         <p:blipFill>
           <a:blip r:embed="rId3"/>
-          <a:stretch>
-            <a:fillRect/>
-          </a:stretch>
+          <a:srcRect/>
+          <a:stretch/>
         </p:blipFill>
         <p:spPr>
           <a:xfrm>
-            <a:off x="506029" y="323867"/>
-            <a:ext cx="5668485" cy="3511345"/>
+            <a:off x="981100" y="27910"/>
+            <a:ext cx="5029083" cy="3017450"/>
           </a:xfrm>
           <a:prstGeom prst="rect">
             <a:avLst/>
@@ -6409,7 +6407,7 @@
         </p:nvSpPr>
         <p:spPr>
           <a:xfrm>
-            <a:off x="490919" y="3767671"/>
+            <a:off x="456683" y="3324933"/>
             <a:ext cx="490181" cy="338554"/>
           </a:xfrm>
           <a:prstGeom prst="rect">
@@ -6453,8 +6451,8 @@
         </p:blipFill>
         <p:spPr>
           <a:xfrm>
-            <a:off x="6766823" y="1892709"/>
-            <a:ext cx="3721510" cy="3721510"/>
+            <a:off x="3824367" y="3266317"/>
+            <a:ext cx="3444228" cy="3444228"/>
           </a:xfrm>
           <a:prstGeom prst="rect">
             <a:avLst/>
@@ -6475,7 +6473,7 @@
         </p:nvSpPr>
         <p:spPr>
           <a:xfrm>
-            <a:off x="6462740" y="1679188"/>
+            <a:off x="3334186" y="3308486"/>
             <a:ext cx="490181" cy="338554"/>
           </a:xfrm>
           <a:prstGeom prst="rect">

</xml_diff>